<commit_message>
Adding ardrone autonomy and followme packages
</commit_message>
<xml_diff>
--- a/Deliverables/04 - Presentation - CSC 5551 - John Erickson.pptx
+++ b/Deliverables/04 - Presentation - CSC 5551 - John Erickson.pptx
@@ -108,6 +108,11 @@
       </a:defRPr>
     </a:lvl9pPr>
   </p:defaultTextStyle>
+  <p:extLst>
+    <p:ext uri="{EFAFB233-063F-42B5-8137-9DF3F51BA10A}">
+      <p15:sldGuideLst xmlns:p15="http://schemas.microsoft.com/office/powerpoint/2012/main"/>
+    </p:ext>
+  </p:extLst>
 </p:presentation>
 </file>
 
@@ -242,7 +247,7 @@
           <a:p>
             <a:fld id="{2E889CC8-63A0-4E6A-B7D5-B4D8E7C6D042}" type="datetimeFigureOut">
               <a:rPr lang="en-US" smtClean="0"/>
-              <a:t>12/11/2015</a:t>
+              <a:t>12/12/2015</a:t>
             </a:fld>
             <a:endParaRPr lang="en-US"/>
           </a:p>
@@ -412,7 +417,7 @@
           <a:p>
             <a:fld id="{2E889CC8-63A0-4E6A-B7D5-B4D8E7C6D042}" type="datetimeFigureOut">
               <a:rPr lang="en-US" smtClean="0"/>
-              <a:t>12/11/2015</a:t>
+              <a:t>12/12/2015</a:t>
             </a:fld>
             <a:endParaRPr lang="en-US"/>
           </a:p>
@@ -592,7 +597,7 @@
           <a:p>
             <a:fld id="{2E889CC8-63A0-4E6A-B7D5-B4D8E7C6D042}" type="datetimeFigureOut">
               <a:rPr lang="en-US" smtClean="0"/>
-              <a:t>12/11/2015</a:t>
+              <a:t>12/12/2015</a:t>
             </a:fld>
             <a:endParaRPr lang="en-US"/>
           </a:p>
@@ -762,7 +767,7 @@
           <a:p>
             <a:fld id="{2E889CC8-63A0-4E6A-B7D5-B4D8E7C6D042}" type="datetimeFigureOut">
               <a:rPr lang="en-US" smtClean="0"/>
-              <a:t>12/11/2015</a:t>
+              <a:t>12/12/2015</a:t>
             </a:fld>
             <a:endParaRPr lang="en-US"/>
           </a:p>
@@ -1008,7 +1013,7 @@
           <a:p>
             <a:fld id="{2E889CC8-63A0-4E6A-B7D5-B4D8E7C6D042}" type="datetimeFigureOut">
               <a:rPr lang="en-US" smtClean="0"/>
-              <a:t>12/11/2015</a:t>
+              <a:t>12/12/2015</a:t>
             </a:fld>
             <a:endParaRPr lang="en-US"/>
           </a:p>
@@ -1240,7 +1245,7 @@
           <a:p>
             <a:fld id="{2E889CC8-63A0-4E6A-B7D5-B4D8E7C6D042}" type="datetimeFigureOut">
               <a:rPr lang="en-US" smtClean="0"/>
-              <a:t>12/11/2015</a:t>
+              <a:t>12/12/2015</a:t>
             </a:fld>
             <a:endParaRPr lang="en-US"/>
           </a:p>
@@ -1607,7 +1612,7 @@
           <a:p>
             <a:fld id="{2E889CC8-63A0-4E6A-B7D5-B4D8E7C6D042}" type="datetimeFigureOut">
               <a:rPr lang="en-US" smtClean="0"/>
-              <a:t>12/11/2015</a:t>
+              <a:t>12/12/2015</a:t>
             </a:fld>
             <a:endParaRPr lang="en-US"/>
           </a:p>
@@ -1725,7 +1730,7 @@
           <a:p>
             <a:fld id="{2E889CC8-63A0-4E6A-B7D5-B4D8E7C6D042}" type="datetimeFigureOut">
               <a:rPr lang="en-US" smtClean="0"/>
-              <a:t>12/11/2015</a:t>
+              <a:t>12/12/2015</a:t>
             </a:fld>
             <a:endParaRPr lang="en-US"/>
           </a:p>
@@ -1820,7 +1825,7 @@
           <a:p>
             <a:fld id="{2E889CC8-63A0-4E6A-B7D5-B4D8E7C6D042}" type="datetimeFigureOut">
               <a:rPr lang="en-US" smtClean="0"/>
-              <a:t>12/11/2015</a:t>
+              <a:t>12/12/2015</a:t>
             </a:fld>
             <a:endParaRPr lang="en-US"/>
           </a:p>
@@ -2097,7 +2102,7 @@
           <a:p>
             <a:fld id="{2E889CC8-63A0-4E6A-B7D5-B4D8E7C6D042}" type="datetimeFigureOut">
               <a:rPr lang="en-US" smtClean="0"/>
-              <a:t>12/11/2015</a:t>
+              <a:t>12/12/2015</a:t>
             </a:fld>
             <a:endParaRPr lang="en-US"/>
           </a:p>
@@ -2354,7 +2359,7 @@
           <a:p>
             <a:fld id="{2E889CC8-63A0-4E6A-B7D5-B4D8E7C6D042}" type="datetimeFigureOut">
               <a:rPr lang="en-US" smtClean="0"/>
-              <a:t>12/11/2015</a:t>
+              <a:t>12/12/2015</a:t>
             </a:fld>
             <a:endParaRPr lang="en-US"/>
           </a:p>
@@ -2585,7 +2590,7 @@
           <a:p>
             <a:fld id="{2E889CC8-63A0-4E6A-B7D5-B4D8E7C6D042}" type="datetimeFigureOut">
               <a:rPr lang="en-US" smtClean="0"/>
-              <a:t>12/11/2015</a:t>
+              <a:t>12/12/2015</a:t>
             </a:fld>
             <a:endParaRPr lang="en-US"/>
           </a:p>
@@ -3227,27 +3232,47 @@
           <a:bodyPr/>
           <a:lstStyle/>
           <a:p>
+            <a:pPr>
+              <a:buFont typeface="Wingdings" panose="05000000000000000000" pitchFamily="2" charset="2"/>
+              <a:buChar char="v"/>
+            </a:pPr>
             <a:r>
               <a:rPr lang="en-US" dirty="0" smtClean="0"/>
               <a:t>…Problem Description…</a:t>
             </a:r>
           </a:p>
           <a:p>
+            <a:pPr>
+              <a:buFont typeface="Wingdings" panose="05000000000000000000" pitchFamily="2" charset="2"/>
+              <a:buChar char="v"/>
+            </a:pPr>
             <a:r>
               <a:rPr lang="en-US" dirty="0" smtClean="0"/>
               <a:t>…Discussion…</a:t>
             </a:r>
           </a:p>
           <a:p>
+            <a:pPr>
+              <a:buFont typeface="Wingdings" panose="05000000000000000000" pitchFamily="2" charset="2"/>
+              <a:buChar char="v"/>
+            </a:pPr>
             <a:r>
               <a:rPr lang="en-US" dirty="0" smtClean="0"/>
               <a:t>…</a:t>
             </a:r>
           </a:p>
           <a:p>
+            <a:pPr>
+              <a:buFont typeface="Wingdings" panose="05000000000000000000" pitchFamily="2" charset="2"/>
+              <a:buChar char="v"/>
+            </a:pPr>
             <a:endParaRPr lang="en-US" dirty="0"/>
           </a:p>
           <a:p>
+            <a:pPr>
+              <a:buFont typeface="Wingdings" panose="05000000000000000000" pitchFamily="2" charset="2"/>
+              <a:buChar char="v"/>
+            </a:pPr>
             <a:r>
               <a:rPr lang="en-US" dirty="0" smtClean="0"/>
               <a:t>Need a bit more detail to make this slide worth while…</a:t>
@@ -3324,7 +3349,15 @@
           <a:bodyPr/>
           <a:lstStyle/>
           <a:p>
-            <a:endParaRPr lang="en-US"/>
+            <a:pPr>
+              <a:buFont typeface="Wingdings" panose="05000000000000000000" pitchFamily="2" charset="2"/>
+              <a:buChar char="v"/>
+            </a:pPr>
+            <a:r>
+              <a:rPr lang="en-US" dirty="0" err="1" smtClean="0"/>
+              <a:t>xxxx</a:t>
+            </a:r>
+            <a:endParaRPr lang="en-US" dirty="0"/>
           </a:p>
         </p:txBody>
       </p:sp>
@@ -3398,6 +3431,10 @@
           </a:bodyPr>
           <a:lstStyle/>
           <a:p>
+            <a:pPr>
+              <a:buFont typeface="Wingdings" panose="05000000000000000000" pitchFamily="2" charset="2"/>
+              <a:buChar char="v"/>
+            </a:pPr>
             <a:r>
               <a:rPr lang="en-US" dirty="0" smtClean="0"/>
               <a:t>Challenges</a:t>
@@ -3418,6 +3455,10 @@
             </a:r>
           </a:p>
           <a:p>
+            <a:pPr>
+              <a:buFont typeface="Wingdings" panose="05000000000000000000" pitchFamily="2" charset="2"/>
+              <a:buChar char="v"/>
+            </a:pPr>
             <a:r>
               <a:rPr lang="en-US" dirty="0" smtClean="0"/>
               <a:t>Assessment</a:t>
@@ -3438,6 +3479,10 @@
             </a:r>
           </a:p>
           <a:p>
+            <a:pPr>
+              <a:buFont typeface="Wingdings" panose="05000000000000000000" pitchFamily="2" charset="2"/>
+              <a:buChar char="v"/>
+            </a:pPr>
             <a:r>
               <a:rPr lang="en-US" dirty="0" smtClean="0"/>
               <a:t>Future Work</a:t>
@@ -3531,30 +3576,50 @@
           <a:bodyPr/>
           <a:lstStyle/>
           <a:p>
+            <a:pPr>
+              <a:buFont typeface="Wingdings" panose="05000000000000000000" pitchFamily="2" charset="2"/>
+              <a:buChar char="v"/>
+            </a:pPr>
             <a:r>
               <a:rPr lang="en-US" dirty="0" smtClean="0"/>
               <a:t>AR.Drone SDK, Parrot</a:t>
             </a:r>
           </a:p>
           <a:p>
+            <a:pPr>
+              <a:buFont typeface="Wingdings" panose="05000000000000000000" pitchFamily="2" charset="2"/>
+              <a:buChar char="v"/>
+            </a:pPr>
             <a:r>
               <a:rPr lang="en-US" dirty="0" smtClean="0"/>
               <a:t>ROS, Open Source Robotics Foundation</a:t>
             </a:r>
           </a:p>
           <a:p>
+            <a:pPr>
+              <a:buFont typeface="Wingdings" panose="05000000000000000000" pitchFamily="2" charset="2"/>
+              <a:buChar char="v"/>
+            </a:pPr>
             <a:r>
               <a:rPr lang="en-US" dirty="0" smtClean="0"/>
               <a:t>Autonomy Lab, Simon Frasier University</a:t>
             </a:r>
           </a:p>
           <a:p>
+            <a:pPr>
+              <a:buFont typeface="Wingdings" panose="05000000000000000000" pitchFamily="2" charset="2"/>
+              <a:buChar char="v"/>
+            </a:pPr>
             <a:r>
               <a:rPr lang="en-US" dirty="0" smtClean="0"/>
               <a:t>AR.Drone Tutorials, Mike Hammer </a:t>
             </a:r>
           </a:p>
           <a:p>
+            <a:pPr>
+              <a:buFont typeface="Wingdings" panose="05000000000000000000" pitchFamily="2" charset="2"/>
+              <a:buChar char="v"/>
+            </a:pPr>
             <a:r>
               <a:rPr lang="en-US" dirty="0" smtClean="0"/>
               <a:t>EZ-Robot, D.J. </a:t>

</xml_diff>